<commit_message>
added presentation to repo
</commit_message>
<xml_diff>
--- a/presentation/7450_presentation.pptx
+++ b/presentation/7450_presentation.pptx
@@ -104,6 +104,32 @@
       </a:defRPr>
     </a:lvl9pPr>
   </p:defaultTextStyle>
+  <p:extLst>
+    <p:ext uri="{521415D9-36F7-43E2-AB2F-B90AF26B5E84}">
+      <p14:sectionLst xmlns:p14="http://schemas.microsoft.com/office/powerpoint/2010/main">
+        <p14:section name="Title" id="{34157E27-9A22-49B0-82A2-607CF8769416}">
+          <p14:sldIdLst>
+            <p14:sldId id="256"/>
+          </p14:sldIdLst>
+        </p14:section>
+        <p14:section name="Context/Relevancy" id="{D31E3DF0-8D0C-4CB2-8EB1-75CE547E7153}">
+          <p14:sldIdLst/>
+        </p14:section>
+        <p14:section name="BM3D Theory" id="{B8D5E6C8-39B8-40F1-9776-E47E63848D45}">
+          <p14:sldIdLst/>
+        </p14:section>
+        <p14:section name="Applications Overview" id="{97648558-F599-4A7C-A219-876A4646D945}">
+          <p14:sldIdLst/>
+        </p14:section>
+        <p14:section name="BM3D Interpolation" id="{8C791A3F-0DCE-41D5-A64D-13120A61A0C8}">
+          <p14:sldIdLst/>
+        </p14:section>
+      </p14:sectionLst>
+    </p:ext>
+    <p:ext uri="{EFAFB233-063F-42B5-8137-9DF3F51BA10A}">
+      <p15:sldGuideLst xmlns:p15="http://schemas.microsoft.com/office/powerpoint/2012/main"/>
+    </p:ext>
+  </p:extLst>
 </p:presentation>
 </file>
 
@@ -254,7 +280,7 @@
           <a:p>
             <a:fld id="{534EA429-CF0F-4E28-8692-C90CECBAC08D}" type="datetimeFigureOut">
               <a:rPr lang="en-US" smtClean="0"/>
-              <a:t>4/9/2019</a:t>
+              <a:t>4/10/2019</a:t>
             </a:fld>
             <a:endParaRPr lang="en-US"/>
           </a:p>
@@ -452,7 +478,7 @@
           <a:p>
             <a:fld id="{534EA429-CF0F-4E28-8692-C90CECBAC08D}" type="datetimeFigureOut">
               <a:rPr lang="en-US" smtClean="0"/>
-              <a:t>4/9/2019</a:t>
+              <a:t>4/10/2019</a:t>
             </a:fld>
             <a:endParaRPr lang="en-US"/>
           </a:p>
@@ -660,7 +686,7 @@
           <a:p>
             <a:fld id="{534EA429-CF0F-4E28-8692-C90CECBAC08D}" type="datetimeFigureOut">
               <a:rPr lang="en-US" smtClean="0"/>
-              <a:t>4/9/2019</a:t>
+              <a:t>4/10/2019</a:t>
             </a:fld>
             <a:endParaRPr lang="en-US"/>
           </a:p>
@@ -858,7 +884,7 @@
           <a:p>
             <a:fld id="{534EA429-CF0F-4E28-8692-C90CECBAC08D}" type="datetimeFigureOut">
               <a:rPr lang="en-US" smtClean="0"/>
-              <a:t>4/9/2019</a:t>
+              <a:t>4/10/2019</a:t>
             </a:fld>
             <a:endParaRPr lang="en-US"/>
           </a:p>
@@ -1133,7 +1159,7 @@
           <a:p>
             <a:fld id="{534EA429-CF0F-4E28-8692-C90CECBAC08D}" type="datetimeFigureOut">
               <a:rPr lang="en-US" smtClean="0"/>
-              <a:t>4/9/2019</a:t>
+              <a:t>4/10/2019</a:t>
             </a:fld>
             <a:endParaRPr lang="en-US"/>
           </a:p>
@@ -1398,7 +1424,7 @@
           <a:p>
             <a:fld id="{534EA429-CF0F-4E28-8692-C90CECBAC08D}" type="datetimeFigureOut">
               <a:rPr lang="en-US" smtClean="0"/>
-              <a:t>4/9/2019</a:t>
+              <a:t>4/10/2019</a:t>
             </a:fld>
             <a:endParaRPr lang="en-US"/>
           </a:p>
@@ -1810,7 +1836,7 @@
           <a:p>
             <a:fld id="{534EA429-CF0F-4E28-8692-C90CECBAC08D}" type="datetimeFigureOut">
               <a:rPr lang="en-US" smtClean="0"/>
-              <a:t>4/9/2019</a:t>
+              <a:t>4/10/2019</a:t>
             </a:fld>
             <a:endParaRPr lang="en-US"/>
           </a:p>
@@ -1951,7 +1977,7 @@
           <a:p>
             <a:fld id="{534EA429-CF0F-4E28-8692-C90CECBAC08D}" type="datetimeFigureOut">
               <a:rPr lang="en-US" smtClean="0"/>
-              <a:t>4/9/2019</a:t>
+              <a:t>4/10/2019</a:t>
             </a:fld>
             <a:endParaRPr lang="en-US"/>
           </a:p>
@@ -2064,7 +2090,7 @@
           <a:p>
             <a:fld id="{534EA429-CF0F-4E28-8692-C90CECBAC08D}" type="datetimeFigureOut">
               <a:rPr lang="en-US" smtClean="0"/>
-              <a:t>4/9/2019</a:t>
+              <a:t>4/10/2019</a:t>
             </a:fld>
             <a:endParaRPr lang="en-US"/>
           </a:p>
@@ -2375,7 +2401,7 @@
           <a:p>
             <a:fld id="{534EA429-CF0F-4E28-8692-C90CECBAC08D}" type="datetimeFigureOut">
               <a:rPr lang="en-US" smtClean="0"/>
-              <a:t>4/9/2019</a:t>
+              <a:t>4/10/2019</a:t>
             </a:fld>
             <a:endParaRPr lang="en-US"/>
           </a:p>
@@ -2663,7 +2689,7 @@
           <a:p>
             <a:fld id="{534EA429-CF0F-4E28-8692-C90CECBAC08D}" type="datetimeFigureOut">
               <a:rPr lang="en-US" smtClean="0"/>
-              <a:t>4/9/2019</a:t>
+              <a:t>4/10/2019</a:t>
             </a:fld>
             <a:endParaRPr lang="en-US"/>
           </a:p>
@@ -2904,7 +2930,7 @@
           <a:p>
             <a:fld id="{534EA429-CF0F-4E28-8692-C90CECBAC08D}" type="datetimeFigureOut">
               <a:rPr lang="en-US" smtClean="0"/>
-              <a:t>4/9/2019</a:t>
+              <a:t>4/10/2019</a:t>
             </a:fld>
             <a:endParaRPr lang="en-US"/>
           </a:p>
@@ -3348,7 +3374,9 @@
           <a:lstStyle/>
           <a:p>
             <a:r>
-              <a:rPr lang="en-US" dirty="0"/>
+              <a:rPr lang="en-US" dirty="0">
+                <a:cs typeface="Arial" panose="020B0604020202020204" pitchFamily="34" charset="0"/>
+              </a:rPr>
               <a:t>BM3D – Theory and Applications</a:t>
             </a:r>
           </a:p>

</xml_diff>